<commit_message>
initial commits starting viz and adding libraries
</commit_message>
<xml_diff>
--- a/proposal/slides/Flow_diagrams.pptx
+++ b/proposal/slides/Flow_diagrams.pptx
@@ -6,6 +6,7 @@
   </p:sldMasterIdLst>
   <p:sldIdLst>
     <p:sldId id="256" r:id="rId2"/>
+    <p:sldId id="257" r:id="rId3"/>
   </p:sldIdLst>
   <p:sldSz cx="9144000" cy="6858000" type="screen4x3"/>
   <p:notesSz cx="6858000" cy="9144000"/>
@@ -288,7 +289,7 @@
           <a:p>
             <a:fld id="{1F29420F-5315-E44F-ACAA-064270912B3B}" type="datetimeFigureOut">
               <a:rPr lang="en-US" smtClean="0"/>
-              <a:t>12/3/13</a:t>
+              <a:t>2/2/14</a:t>
             </a:fld>
             <a:endParaRPr lang="en-US"/>
           </a:p>
@@ -458,7 +459,7 @@
           <a:p>
             <a:fld id="{1F29420F-5315-E44F-ACAA-064270912B3B}" type="datetimeFigureOut">
               <a:rPr lang="en-US" smtClean="0"/>
-              <a:t>12/3/13</a:t>
+              <a:t>2/2/14</a:t>
             </a:fld>
             <a:endParaRPr lang="en-US"/>
           </a:p>
@@ -638,7 +639,7 @@
           <a:p>
             <a:fld id="{1F29420F-5315-E44F-ACAA-064270912B3B}" type="datetimeFigureOut">
               <a:rPr lang="en-US" smtClean="0"/>
-              <a:t>12/3/13</a:t>
+              <a:t>2/2/14</a:t>
             </a:fld>
             <a:endParaRPr lang="en-US"/>
           </a:p>
@@ -808,7 +809,7 @@
           <a:p>
             <a:fld id="{1F29420F-5315-E44F-ACAA-064270912B3B}" type="datetimeFigureOut">
               <a:rPr lang="en-US" smtClean="0"/>
-              <a:t>12/3/13</a:t>
+              <a:t>2/2/14</a:t>
             </a:fld>
             <a:endParaRPr lang="en-US"/>
           </a:p>
@@ -1054,7 +1055,7 @@
           <a:p>
             <a:fld id="{1F29420F-5315-E44F-ACAA-064270912B3B}" type="datetimeFigureOut">
               <a:rPr lang="en-US" smtClean="0"/>
-              <a:t>12/3/13</a:t>
+              <a:t>2/2/14</a:t>
             </a:fld>
             <a:endParaRPr lang="en-US"/>
           </a:p>
@@ -1342,7 +1343,7 @@
           <a:p>
             <a:fld id="{1F29420F-5315-E44F-ACAA-064270912B3B}" type="datetimeFigureOut">
               <a:rPr lang="en-US" smtClean="0"/>
-              <a:t>12/3/13</a:t>
+              <a:t>2/2/14</a:t>
             </a:fld>
             <a:endParaRPr lang="en-US"/>
           </a:p>
@@ -1764,7 +1765,7 @@
           <a:p>
             <a:fld id="{1F29420F-5315-E44F-ACAA-064270912B3B}" type="datetimeFigureOut">
               <a:rPr lang="en-US" smtClean="0"/>
-              <a:t>12/3/13</a:t>
+              <a:t>2/2/14</a:t>
             </a:fld>
             <a:endParaRPr lang="en-US"/>
           </a:p>
@@ -1882,7 +1883,7 @@
           <a:p>
             <a:fld id="{1F29420F-5315-E44F-ACAA-064270912B3B}" type="datetimeFigureOut">
               <a:rPr lang="en-US" smtClean="0"/>
-              <a:t>12/3/13</a:t>
+              <a:t>2/2/14</a:t>
             </a:fld>
             <a:endParaRPr lang="en-US"/>
           </a:p>
@@ -1977,7 +1978,7 @@
           <a:p>
             <a:fld id="{1F29420F-5315-E44F-ACAA-064270912B3B}" type="datetimeFigureOut">
               <a:rPr lang="en-US" smtClean="0"/>
-              <a:t>12/3/13</a:t>
+              <a:t>2/2/14</a:t>
             </a:fld>
             <a:endParaRPr lang="en-US"/>
           </a:p>
@@ -2254,7 +2255,7 @@
           <a:p>
             <a:fld id="{1F29420F-5315-E44F-ACAA-064270912B3B}" type="datetimeFigureOut">
               <a:rPr lang="en-US" smtClean="0"/>
-              <a:t>12/3/13</a:t>
+              <a:t>2/2/14</a:t>
             </a:fld>
             <a:endParaRPr lang="en-US"/>
           </a:p>
@@ -2507,7 +2508,7 @@
           <a:p>
             <a:fld id="{1F29420F-5315-E44F-ACAA-064270912B3B}" type="datetimeFigureOut">
               <a:rPr lang="en-US" smtClean="0"/>
-              <a:t>12/3/13</a:t>
+              <a:t>2/2/14</a:t>
             </a:fld>
             <a:endParaRPr lang="en-US"/>
           </a:p>
@@ -2720,7 +2721,7 @@
           <a:p>
             <a:fld id="{1F29420F-5315-E44F-ACAA-064270912B3B}" type="datetimeFigureOut">
               <a:rPr lang="en-US" smtClean="0"/>
-              <a:t>12/3/13</a:t>
+              <a:t>2/2/14</a:t>
             </a:fld>
             <a:endParaRPr lang="en-US"/>
           </a:p>
@@ -3591,6 +3592,617 @@
 </p:sld>
 </file>
 
+<file path=ppt/slides/slide2.xml><?xml version="1.0" encoding="utf-8"?>
+<p:sld xmlns:a="http://schemas.openxmlformats.org/drawingml/2006/main" xmlns:r="http://schemas.openxmlformats.org/officeDocument/2006/relationships" xmlns:p="http://schemas.openxmlformats.org/presentationml/2006/main">
+  <p:cSld>
+    <p:spTree>
+      <p:nvGrpSpPr>
+        <p:cNvPr id="1" name=""/>
+        <p:cNvGrpSpPr/>
+        <p:nvPr/>
+      </p:nvGrpSpPr>
+      <p:grpSpPr>
+        <a:xfrm>
+          <a:off x="0" y="0"/>
+          <a:ext cx="0" cy="0"/>
+          <a:chOff x="0" y="0"/>
+          <a:chExt cx="0" cy="0"/>
+        </a:xfrm>
+      </p:grpSpPr>
+      <p:sp>
+        <p:nvSpPr>
+          <p:cNvPr id="2" name="Rounded Rectangle 1"/>
+          <p:cNvSpPr/>
+          <p:nvPr/>
+        </p:nvSpPr>
+        <p:spPr>
+          <a:xfrm>
+            <a:off x="3410054" y="22683"/>
+            <a:ext cx="1394775" cy="941239"/>
+          </a:xfrm>
+          <a:prstGeom prst="roundRect">
+            <a:avLst/>
+          </a:prstGeom>
+        </p:spPr>
+        <p:style>
+          <a:lnRef idx="1">
+            <a:schemeClr val="accent1"/>
+          </a:lnRef>
+          <a:fillRef idx="3">
+            <a:schemeClr val="accent1"/>
+          </a:fillRef>
+          <a:effectRef idx="2">
+            <a:schemeClr val="accent1"/>
+          </a:effectRef>
+          <a:fontRef idx="minor">
+            <a:schemeClr val="lt1"/>
+          </a:fontRef>
+        </p:style>
+        <p:txBody>
+          <a:bodyPr rtlCol="0" anchor="ctr"/>
+          <a:lstStyle/>
+          <a:p>
+            <a:pPr algn="ctr"/>
+            <a:r>
+              <a:rPr lang="en-US" dirty="0" smtClean="0"/>
+              <a:t>1. </a:t>
+            </a:r>
+            <a:r>
+              <a:rPr lang="en-US" dirty="0"/>
+              <a:t>O</a:t>
+            </a:r>
+            <a:r>
+              <a:rPr lang="en-US" dirty="0" smtClean="0"/>
+              <a:t>rder Q</a:t>
+            </a:r>
+            <a:endParaRPr lang="en-US" dirty="0"/>
+          </a:p>
+        </p:txBody>
+      </p:sp>
+      <p:sp>
+        <p:nvSpPr>
+          <p:cNvPr id="3" name="Rounded Rectangle 2"/>
+          <p:cNvSpPr/>
+          <p:nvPr/>
+        </p:nvSpPr>
+        <p:spPr>
+          <a:xfrm>
+            <a:off x="2681139" y="1168045"/>
+            <a:ext cx="2852604" cy="1394848"/>
+          </a:xfrm>
+          <a:prstGeom prst="roundRect">
+            <a:avLst/>
+          </a:prstGeom>
+        </p:spPr>
+        <p:style>
+          <a:lnRef idx="1">
+            <a:schemeClr val="accent1"/>
+          </a:lnRef>
+          <a:fillRef idx="3">
+            <a:schemeClr val="accent1"/>
+          </a:fillRef>
+          <a:effectRef idx="2">
+            <a:schemeClr val="accent1"/>
+          </a:effectRef>
+          <a:fontRef idx="minor">
+            <a:schemeClr val="lt1"/>
+          </a:fontRef>
+        </p:style>
+        <p:txBody>
+          <a:bodyPr rtlCol="0" anchor="ctr"/>
+          <a:lstStyle/>
+          <a:p>
+            <a:pPr lvl="0" algn="ctr"/>
+            <a:r>
+              <a:rPr lang="en-US" dirty="0" smtClean="0"/>
+              <a:t>2. </a:t>
+            </a:r>
+            <a:r>
+              <a:rPr lang="en-US" dirty="0"/>
+              <a:t>C</a:t>
+            </a:r>
+            <a:r>
+              <a:rPr lang="en-US" dirty="0" smtClean="0"/>
+              <a:t>ompute </a:t>
+            </a:r>
+            <a:r>
+              <a:rPr lang="en-US" dirty="0" err="1"/>
+              <a:t>ES</a:t>
+            </a:r>
+            <a:r>
+              <a:rPr lang="en-US" baseline="-25000" dirty="0" err="1"/>
+              <a:t>up</a:t>
+            </a:r>
+            <a:r>
+              <a:rPr lang="en-US" dirty="0"/>
+              <a:t> as the enrichment of the n most up-regulated genes in </a:t>
+            </a:r>
+            <a:r>
+              <a:rPr lang="en-US" dirty="0" smtClean="0"/>
+              <a:t>R</a:t>
+            </a:r>
+            <a:endParaRPr lang="en-US" dirty="0"/>
+          </a:p>
+        </p:txBody>
+      </p:sp>
+      <p:sp>
+        <p:nvSpPr>
+          <p:cNvPr id="4" name="Rounded Rectangle 3"/>
+          <p:cNvSpPr/>
+          <p:nvPr/>
+        </p:nvSpPr>
+        <p:spPr>
+          <a:xfrm>
+            <a:off x="2681139" y="2817355"/>
+            <a:ext cx="2852604" cy="1394848"/>
+          </a:xfrm>
+          <a:prstGeom prst="roundRect">
+            <a:avLst/>
+          </a:prstGeom>
+        </p:spPr>
+        <p:style>
+          <a:lnRef idx="1">
+            <a:schemeClr val="accent1"/>
+          </a:lnRef>
+          <a:fillRef idx="3">
+            <a:schemeClr val="accent1"/>
+          </a:fillRef>
+          <a:effectRef idx="2">
+            <a:schemeClr val="accent1"/>
+          </a:effectRef>
+          <a:fontRef idx="minor">
+            <a:schemeClr val="lt1"/>
+          </a:fontRef>
+        </p:style>
+        <p:txBody>
+          <a:bodyPr rtlCol="0" anchor="ctr"/>
+          <a:lstStyle/>
+          <a:p>
+            <a:pPr lvl="0" algn="ctr"/>
+            <a:r>
+              <a:rPr lang="en-US" dirty="0" smtClean="0"/>
+              <a:t>3. Compute </a:t>
+            </a:r>
+            <a:r>
+              <a:rPr lang="en-US" dirty="0" err="1" smtClean="0"/>
+              <a:t>ES</a:t>
+            </a:r>
+            <a:r>
+              <a:rPr lang="en-US" baseline="-25000" dirty="0" err="1" smtClean="0"/>
+              <a:t>dn</a:t>
+            </a:r>
+            <a:r>
+              <a:rPr lang="en-US" dirty="0" smtClean="0"/>
+              <a:t> </a:t>
+            </a:r>
+            <a:r>
+              <a:rPr lang="en-US" dirty="0"/>
+              <a:t>as the enrichment of the n most </a:t>
+            </a:r>
+            <a:r>
+              <a:rPr lang="en-US" dirty="0" smtClean="0"/>
+              <a:t>down-</a:t>
+            </a:r>
+            <a:r>
+              <a:rPr lang="en-US" dirty="0"/>
+              <a:t>regulated genes in </a:t>
+            </a:r>
+            <a:r>
+              <a:rPr lang="en-US" dirty="0" smtClean="0"/>
+              <a:t>R</a:t>
+            </a:r>
+            <a:endParaRPr lang="en-US" dirty="0"/>
+          </a:p>
+        </p:txBody>
+      </p:sp>
+      <p:sp>
+        <p:nvSpPr>
+          <p:cNvPr id="6" name="Rounded Rectangle 5"/>
+          <p:cNvSpPr/>
+          <p:nvPr/>
+        </p:nvSpPr>
+        <p:spPr>
+          <a:xfrm>
+            <a:off x="2007117" y="5323539"/>
+            <a:ext cx="1558514" cy="1417529"/>
+          </a:xfrm>
+          <a:prstGeom prst="roundRect">
+            <a:avLst/>
+          </a:prstGeom>
+        </p:spPr>
+        <p:style>
+          <a:lnRef idx="1">
+            <a:schemeClr val="accent1"/>
+          </a:lnRef>
+          <a:fillRef idx="3">
+            <a:schemeClr val="accent1"/>
+          </a:fillRef>
+          <a:effectRef idx="2">
+            <a:schemeClr val="accent1"/>
+          </a:effectRef>
+          <a:fontRef idx="minor">
+            <a:schemeClr val="lt1"/>
+          </a:fontRef>
+        </p:style>
+        <p:txBody>
+          <a:bodyPr rtlCol="0" anchor="ctr"/>
+          <a:lstStyle/>
+          <a:p>
+            <a:pPr algn="ctr"/>
+            <a:r>
+              <a:rPr lang="en-US" dirty="0" smtClean="0"/>
+              <a:t>0</a:t>
+            </a:r>
+            <a:endParaRPr lang="en-US" dirty="0"/>
+          </a:p>
+        </p:txBody>
+      </p:sp>
+      <p:sp>
+        <p:nvSpPr>
+          <p:cNvPr id="7" name="Rounded Rectangle 6"/>
+          <p:cNvSpPr/>
+          <p:nvPr/>
+        </p:nvSpPr>
+        <p:spPr>
+          <a:xfrm>
+            <a:off x="4121959" y="5323539"/>
+            <a:ext cx="2823568" cy="1417529"/>
+          </a:xfrm>
+          <a:prstGeom prst="roundRect">
+            <a:avLst/>
+          </a:prstGeom>
+        </p:spPr>
+        <p:style>
+          <a:lnRef idx="1">
+            <a:schemeClr val="accent1"/>
+          </a:lnRef>
+          <a:fillRef idx="3">
+            <a:schemeClr val="accent1"/>
+          </a:fillRef>
+          <a:effectRef idx="2">
+            <a:schemeClr val="accent1"/>
+          </a:effectRef>
+          <a:fontRef idx="minor">
+            <a:schemeClr val="lt1"/>
+          </a:fontRef>
+        </p:style>
+        <p:txBody>
+          <a:bodyPr rtlCol="0" anchor="ctr"/>
+          <a:lstStyle/>
+          <a:p>
+            <a:pPr algn="ctr"/>
+            <a:r>
+              <a:rPr lang="en-US" dirty="0" smtClean="0"/>
+              <a:t>(|</a:t>
+            </a:r>
+            <a:r>
+              <a:rPr lang="en-US" dirty="0" err="1"/>
+              <a:t>ES</a:t>
+            </a:r>
+            <a:r>
+              <a:rPr lang="en-US" baseline="-25000" dirty="0" err="1"/>
+              <a:t>up</a:t>
+            </a:r>
+            <a:r>
+              <a:rPr lang="en-US" dirty="0" smtClean="0"/>
+              <a:t>|+|</a:t>
+            </a:r>
+            <a:r>
+              <a:rPr lang="en-US" dirty="0" err="1" smtClean="0"/>
+              <a:t>ES</a:t>
+            </a:r>
+            <a:r>
+              <a:rPr lang="en-US" baseline="-25000" dirty="0" err="1" smtClean="0"/>
+              <a:t>dn</a:t>
+            </a:r>
+            <a:r>
+              <a:rPr lang="en-US" dirty="0" smtClean="0"/>
+              <a:t>|) / 2 </a:t>
+            </a:r>
+            <a:r>
+              <a:rPr lang="en-US" dirty="0"/>
+              <a:t>, where the resulting WTCS is given the sign of </a:t>
+            </a:r>
+            <a:r>
+              <a:rPr lang="en-US" dirty="0" err="1"/>
+              <a:t>ES</a:t>
+            </a:r>
+            <a:r>
+              <a:rPr lang="en-US" baseline="-25000" dirty="0" err="1"/>
+              <a:t>up</a:t>
+            </a:r>
+            <a:r>
+              <a:rPr lang="en-US" dirty="0"/>
+              <a:t> </a:t>
+            </a:r>
+            <a:endParaRPr lang="en-US" dirty="0"/>
+          </a:p>
+        </p:txBody>
+      </p:sp>
+      <p:cxnSp>
+        <p:nvCxnSpPr>
+          <p:cNvPr id="11" name="Straight Arrow Connector 10"/>
+          <p:cNvCxnSpPr/>
+          <p:nvPr/>
+        </p:nvCxnSpPr>
+        <p:spPr>
+          <a:xfrm flipH="1">
+            <a:off x="4107441" y="963922"/>
+            <a:ext cx="1" cy="204123"/>
+          </a:xfrm>
+          <a:prstGeom prst="straightConnector1">
+            <a:avLst/>
+          </a:prstGeom>
+          <a:ln>
+            <a:tailEnd type="arrow"/>
+          </a:ln>
+        </p:spPr>
+        <p:style>
+          <a:lnRef idx="2">
+            <a:schemeClr val="accent1"/>
+          </a:lnRef>
+          <a:fillRef idx="0">
+            <a:schemeClr val="accent1"/>
+          </a:fillRef>
+          <a:effectRef idx="1">
+            <a:schemeClr val="accent1"/>
+          </a:effectRef>
+          <a:fontRef idx="minor">
+            <a:schemeClr val="tx1"/>
+          </a:fontRef>
+        </p:style>
+      </p:cxnSp>
+      <p:cxnSp>
+        <p:nvCxnSpPr>
+          <p:cNvPr id="13" name="Straight Arrow Connector 12"/>
+          <p:cNvCxnSpPr/>
+          <p:nvPr/>
+        </p:nvCxnSpPr>
+        <p:spPr>
+          <a:xfrm>
+            <a:off x="4107441" y="2562893"/>
+            <a:ext cx="0" cy="254462"/>
+          </a:xfrm>
+          <a:prstGeom prst="straightConnector1">
+            <a:avLst/>
+          </a:prstGeom>
+          <a:ln>
+            <a:tailEnd type="arrow"/>
+          </a:ln>
+        </p:spPr>
+        <p:style>
+          <a:lnRef idx="2">
+            <a:schemeClr val="accent1"/>
+          </a:lnRef>
+          <a:fillRef idx="0">
+            <a:schemeClr val="accent1"/>
+          </a:fillRef>
+          <a:effectRef idx="1">
+            <a:schemeClr val="accent1"/>
+          </a:effectRef>
+          <a:fontRef idx="minor">
+            <a:schemeClr val="tx1"/>
+          </a:fontRef>
+        </p:style>
+      </p:cxnSp>
+      <p:cxnSp>
+        <p:nvCxnSpPr>
+          <p:cNvPr id="15" name="Straight Arrow Connector 14"/>
+          <p:cNvCxnSpPr>
+            <a:stCxn id="4" idx="2"/>
+            <a:endCxn id="6" idx="0"/>
+          </p:cNvCxnSpPr>
+          <p:nvPr/>
+        </p:nvCxnSpPr>
+        <p:spPr>
+          <a:xfrm flipH="1">
+            <a:off x="2786374" y="4212203"/>
+            <a:ext cx="1321067" cy="1111336"/>
+          </a:xfrm>
+          <a:prstGeom prst="straightConnector1">
+            <a:avLst/>
+          </a:prstGeom>
+          <a:ln>
+            <a:tailEnd type="arrow"/>
+          </a:ln>
+        </p:spPr>
+        <p:style>
+          <a:lnRef idx="2">
+            <a:schemeClr val="accent1"/>
+          </a:lnRef>
+          <a:fillRef idx="0">
+            <a:schemeClr val="accent1"/>
+          </a:fillRef>
+          <a:effectRef idx="1">
+            <a:schemeClr val="accent1"/>
+          </a:effectRef>
+          <a:fontRef idx="minor">
+            <a:schemeClr val="tx1"/>
+          </a:fontRef>
+        </p:style>
+      </p:cxnSp>
+      <p:cxnSp>
+        <p:nvCxnSpPr>
+          <p:cNvPr id="17" name="Straight Arrow Connector 16"/>
+          <p:cNvCxnSpPr>
+            <a:stCxn id="4" idx="2"/>
+            <a:endCxn id="7" idx="0"/>
+          </p:cNvCxnSpPr>
+          <p:nvPr/>
+        </p:nvCxnSpPr>
+        <p:spPr>
+          <a:xfrm>
+            <a:off x="4107441" y="4212203"/>
+            <a:ext cx="1426302" cy="1111336"/>
+          </a:xfrm>
+          <a:prstGeom prst="straightConnector1">
+            <a:avLst/>
+          </a:prstGeom>
+          <a:ln>
+            <a:tailEnd type="arrow"/>
+          </a:ln>
+        </p:spPr>
+        <p:style>
+          <a:lnRef idx="2">
+            <a:schemeClr val="accent1"/>
+          </a:lnRef>
+          <a:fillRef idx="0">
+            <a:schemeClr val="accent1"/>
+          </a:fillRef>
+          <a:effectRef idx="1">
+            <a:schemeClr val="accent1"/>
+          </a:effectRef>
+          <a:fontRef idx="minor">
+            <a:schemeClr val="tx1"/>
+          </a:fontRef>
+        </p:style>
+      </p:cxnSp>
+      <p:sp>
+        <p:nvSpPr>
+          <p:cNvPr id="20" name="TextBox 19"/>
+          <p:cNvSpPr txBox="1"/>
+          <p:nvPr/>
+        </p:nvSpPr>
+        <p:spPr>
+          <a:xfrm>
+            <a:off x="-374207" y="5964957"/>
+            <a:ext cx="1988518" cy="369332"/>
+          </a:xfrm>
+          <a:prstGeom prst="rect">
+            <a:avLst/>
+          </a:prstGeom>
+          <a:noFill/>
+        </p:spPr>
+        <p:txBody>
+          <a:bodyPr wrap="square" rtlCol="0">
+            <a:spAutoFit/>
+          </a:bodyPr>
+          <a:lstStyle/>
+          <a:p>
+            <a:pPr algn="r"/>
+            <a:r>
+              <a:rPr lang="en-US" b="1" dirty="0" smtClean="0"/>
+              <a:t>4. Compute WTCS:</a:t>
+            </a:r>
+            <a:endParaRPr lang="en-US" b="1" dirty="0"/>
+          </a:p>
+        </p:txBody>
+      </p:sp>
+      <p:sp>
+        <p:nvSpPr>
+          <p:cNvPr id="21" name="TextBox 20"/>
+          <p:cNvSpPr txBox="1"/>
+          <p:nvPr/>
+        </p:nvSpPr>
+        <p:spPr>
+          <a:xfrm>
+            <a:off x="839134" y="4422687"/>
+            <a:ext cx="2335965" cy="646331"/>
+          </a:xfrm>
+          <a:prstGeom prst="rect">
+            <a:avLst/>
+          </a:prstGeom>
+          <a:noFill/>
+        </p:spPr>
+        <p:txBody>
+          <a:bodyPr wrap="square" rtlCol="0">
+            <a:spAutoFit/>
+          </a:bodyPr>
+          <a:lstStyle/>
+          <a:p>
+            <a:pPr algn="ctr"/>
+            <a:r>
+              <a:rPr lang="en-US" dirty="0" err="1" smtClean="0"/>
+              <a:t>ES</a:t>
+            </a:r>
+            <a:r>
+              <a:rPr lang="en-US" baseline="-25000" dirty="0" err="1" smtClean="0"/>
+              <a:t>up</a:t>
+            </a:r>
+            <a:r>
+              <a:rPr lang="en-US" baseline="-25000" dirty="0" smtClean="0"/>
+              <a:t> and </a:t>
+            </a:r>
+            <a:r>
+              <a:rPr lang="en-US" dirty="0" err="1" smtClean="0"/>
+              <a:t>ES</a:t>
+            </a:r>
+            <a:r>
+              <a:rPr lang="en-US" baseline="-25000" dirty="0" err="1" smtClean="0"/>
+              <a:t>dn</a:t>
+            </a:r>
+            <a:r>
+              <a:rPr lang="en-US" dirty="0" smtClean="0"/>
+              <a:t> are of the same sign</a:t>
+            </a:r>
+            <a:endParaRPr lang="en-US" dirty="0"/>
+          </a:p>
+        </p:txBody>
+      </p:sp>
+      <p:sp>
+        <p:nvSpPr>
+          <p:cNvPr id="22" name="TextBox 21"/>
+          <p:cNvSpPr txBox="1"/>
+          <p:nvPr/>
+        </p:nvSpPr>
+        <p:spPr>
+          <a:xfrm>
+            <a:off x="5413993" y="4422687"/>
+            <a:ext cx="2335965" cy="646331"/>
+          </a:xfrm>
+          <a:prstGeom prst="rect">
+            <a:avLst/>
+          </a:prstGeom>
+          <a:noFill/>
+        </p:spPr>
+        <p:txBody>
+          <a:bodyPr wrap="square" rtlCol="0">
+            <a:spAutoFit/>
+          </a:bodyPr>
+          <a:lstStyle/>
+          <a:p>
+            <a:pPr algn="ctr"/>
+            <a:r>
+              <a:rPr lang="en-US" dirty="0" err="1" smtClean="0"/>
+              <a:t>ES</a:t>
+            </a:r>
+            <a:r>
+              <a:rPr lang="en-US" baseline="-25000" dirty="0" err="1" smtClean="0"/>
+              <a:t>up</a:t>
+            </a:r>
+            <a:r>
+              <a:rPr lang="en-US" baseline="-25000" dirty="0" smtClean="0"/>
+              <a:t> and </a:t>
+            </a:r>
+            <a:r>
+              <a:rPr lang="en-US" dirty="0" err="1" smtClean="0"/>
+              <a:t>ES</a:t>
+            </a:r>
+            <a:r>
+              <a:rPr lang="en-US" baseline="-25000" dirty="0" err="1" smtClean="0"/>
+              <a:t>dn</a:t>
+            </a:r>
+            <a:r>
+              <a:rPr lang="en-US" dirty="0" smtClean="0"/>
+              <a:t> are of different sign</a:t>
+            </a:r>
+            <a:endParaRPr lang="en-US" dirty="0"/>
+          </a:p>
+        </p:txBody>
+      </p:sp>
+    </p:spTree>
+    <p:extLst>
+      <p:ext uri="{BB962C8B-B14F-4D97-AF65-F5344CB8AC3E}">
+        <p14:creationId xmlns:p14="http://schemas.microsoft.com/office/powerpoint/2010/main" val="1713901043"/>
+      </p:ext>
+    </p:extLst>
+  </p:cSld>
+  <p:clrMapOvr>
+    <a:masterClrMapping/>
+  </p:clrMapOvr>
+</p:sld>
+</file>
+
 <file path=ppt/theme/theme1.xml><?xml version="1.0" encoding="utf-8"?>
 <a:theme xmlns:a="http://schemas.openxmlformats.org/drawingml/2006/main" name="Office Theme">
   <a:themeElements>

</xml_diff>

<commit_message>
script to do DMSO nulls
</commit_message>
<xml_diff>
--- a/proposal/slides/Flow_diagrams.pptx
+++ b/proposal/slides/Flow_diagrams.pptx
@@ -6,7 +6,8 @@
   </p:sldMasterIdLst>
   <p:sldIdLst>
     <p:sldId id="256" r:id="rId2"/>
-    <p:sldId id="257" r:id="rId3"/>
+    <p:sldId id="258" r:id="rId3"/>
+    <p:sldId id="257" r:id="rId4"/>
   </p:sldIdLst>
   <p:sldSz cx="9144000" cy="6858000" type="screen4x3"/>
   <p:notesSz cx="6858000" cy="9144000"/>
@@ -289,7 +290,7 @@
           <a:p>
             <a:fld id="{1F29420F-5315-E44F-ACAA-064270912B3B}" type="datetimeFigureOut">
               <a:rPr lang="en-US" smtClean="0"/>
-              <a:t>2/2/14</a:t>
+              <a:t>7/13/14</a:t>
             </a:fld>
             <a:endParaRPr lang="en-US"/>
           </a:p>
@@ -459,7 +460,7 @@
           <a:p>
             <a:fld id="{1F29420F-5315-E44F-ACAA-064270912B3B}" type="datetimeFigureOut">
               <a:rPr lang="en-US" smtClean="0"/>
-              <a:t>2/2/14</a:t>
+              <a:t>7/13/14</a:t>
             </a:fld>
             <a:endParaRPr lang="en-US"/>
           </a:p>
@@ -639,7 +640,7 @@
           <a:p>
             <a:fld id="{1F29420F-5315-E44F-ACAA-064270912B3B}" type="datetimeFigureOut">
               <a:rPr lang="en-US" smtClean="0"/>
-              <a:t>2/2/14</a:t>
+              <a:t>7/13/14</a:t>
             </a:fld>
             <a:endParaRPr lang="en-US"/>
           </a:p>
@@ -809,7 +810,7 @@
           <a:p>
             <a:fld id="{1F29420F-5315-E44F-ACAA-064270912B3B}" type="datetimeFigureOut">
               <a:rPr lang="en-US" smtClean="0"/>
-              <a:t>2/2/14</a:t>
+              <a:t>7/13/14</a:t>
             </a:fld>
             <a:endParaRPr lang="en-US"/>
           </a:p>
@@ -1055,7 +1056,7 @@
           <a:p>
             <a:fld id="{1F29420F-5315-E44F-ACAA-064270912B3B}" type="datetimeFigureOut">
               <a:rPr lang="en-US" smtClean="0"/>
-              <a:t>2/2/14</a:t>
+              <a:t>7/13/14</a:t>
             </a:fld>
             <a:endParaRPr lang="en-US"/>
           </a:p>
@@ -1343,7 +1344,7 @@
           <a:p>
             <a:fld id="{1F29420F-5315-E44F-ACAA-064270912B3B}" type="datetimeFigureOut">
               <a:rPr lang="en-US" smtClean="0"/>
-              <a:t>2/2/14</a:t>
+              <a:t>7/13/14</a:t>
             </a:fld>
             <a:endParaRPr lang="en-US"/>
           </a:p>
@@ -1765,7 +1766,7 @@
           <a:p>
             <a:fld id="{1F29420F-5315-E44F-ACAA-064270912B3B}" type="datetimeFigureOut">
               <a:rPr lang="en-US" smtClean="0"/>
-              <a:t>2/2/14</a:t>
+              <a:t>7/13/14</a:t>
             </a:fld>
             <a:endParaRPr lang="en-US"/>
           </a:p>
@@ -1883,7 +1884,7 @@
           <a:p>
             <a:fld id="{1F29420F-5315-E44F-ACAA-064270912B3B}" type="datetimeFigureOut">
               <a:rPr lang="en-US" smtClean="0"/>
-              <a:t>2/2/14</a:t>
+              <a:t>7/13/14</a:t>
             </a:fld>
             <a:endParaRPr lang="en-US"/>
           </a:p>
@@ -1978,7 +1979,7 @@
           <a:p>
             <a:fld id="{1F29420F-5315-E44F-ACAA-064270912B3B}" type="datetimeFigureOut">
               <a:rPr lang="en-US" smtClean="0"/>
-              <a:t>2/2/14</a:t>
+              <a:t>7/13/14</a:t>
             </a:fld>
             <a:endParaRPr lang="en-US"/>
           </a:p>
@@ -2255,7 +2256,7 @@
           <a:p>
             <a:fld id="{1F29420F-5315-E44F-ACAA-064270912B3B}" type="datetimeFigureOut">
               <a:rPr lang="en-US" smtClean="0"/>
-              <a:t>2/2/14</a:t>
+              <a:t>7/13/14</a:t>
             </a:fld>
             <a:endParaRPr lang="en-US"/>
           </a:p>
@@ -2508,7 +2509,7 @@
           <a:p>
             <a:fld id="{1F29420F-5315-E44F-ACAA-064270912B3B}" type="datetimeFigureOut">
               <a:rPr lang="en-US" smtClean="0"/>
-              <a:t>2/2/14</a:t>
+              <a:t>7/13/14</a:t>
             </a:fld>
             <a:endParaRPr lang="en-US"/>
           </a:p>
@@ -2721,7 +2722,7 @@
           <a:p>
             <a:fld id="{1F29420F-5315-E44F-ACAA-064270912B3B}" type="datetimeFigureOut">
               <a:rPr lang="en-US" smtClean="0"/>
-              <a:t>2/2/14</a:t>
+              <a:t>7/13/14</a:t>
             </a:fld>
             <a:endParaRPr lang="en-US"/>
           </a:p>
@@ -3609,6 +3610,751 @@
           <a:chExt cx="0" cy="0"/>
         </a:xfrm>
       </p:grpSpPr>
+      <p:grpSp>
+        <p:nvGrpSpPr>
+          <p:cNvPr id="3" name="Group 2"/>
+          <p:cNvGrpSpPr/>
+          <p:nvPr/>
+        </p:nvGrpSpPr>
+        <p:grpSpPr>
+          <a:xfrm>
+            <a:off x="-487605" y="1211834"/>
+            <a:ext cx="8776880" cy="4900547"/>
+            <a:chOff x="-487605" y="1211834"/>
+            <a:chExt cx="8776880" cy="4900547"/>
+          </a:xfrm>
+        </p:grpSpPr>
+        <p:grpSp>
+          <p:nvGrpSpPr>
+            <p:cNvPr id="25" name="Group 24"/>
+            <p:cNvGrpSpPr/>
+            <p:nvPr/>
+          </p:nvGrpSpPr>
+          <p:grpSpPr>
+            <a:xfrm>
+              <a:off x="-487605" y="1211834"/>
+              <a:ext cx="8776880" cy="2612940"/>
+              <a:chOff x="-487605" y="1211834"/>
+              <a:chExt cx="8776880" cy="2612940"/>
+            </a:xfrm>
+          </p:grpSpPr>
+          <p:sp>
+            <p:nvSpPr>
+              <p:cNvPr id="4" name="Rounded Rectangle 3"/>
+              <p:cNvSpPr/>
+              <p:nvPr/>
+            </p:nvSpPr>
+            <p:spPr>
+              <a:xfrm>
+                <a:off x="1111279" y="1735054"/>
+                <a:ext cx="1349422" cy="1156703"/>
+              </a:xfrm>
+              <a:prstGeom prst="roundRect">
+                <a:avLst/>
+              </a:prstGeom>
+            </p:spPr>
+            <p:style>
+              <a:lnRef idx="1">
+                <a:schemeClr val="accent1"/>
+              </a:lnRef>
+              <a:fillRef idx="3">
+                <a:schemeClr val="accent1"/>
+              </a:fillRef>
+              <a:effectRef idx="2">
+                <a:schemeClr val="accent1"/>
+              </a:effectRef>
+              <a:fontRef idx="minor">
+                <a:schemeClr val="lt1"/>
+              </a:fontRef>
+            </p:style>
+            <p:txBody>
+              <a:bodyPr rtlCol="0" anchor="ctr"/>
+              <a:lstStyle/>
+              <a:p>
+                <a:pPr algn="ctr"/>
+                <a:r>
+                  <a:rPr lang="en-US" dirty="0" smtClean="0"/>
+                  <a:t>web application</a:t>
+                </a:r>
+                <a:endParaRPr lang="en-US" dirty="0"/>
+              </a:p>
+            </p:txBody>
+          </p:sp>
+          <p:sp>
+            <p:nvSpPr>
+              <p:cNvPr id="5" name="Rounded Rectangle 4"/>
+              <p:cNvSpPr/>
+              <p:nvPr/>
+            </p:nvSpPr>
+            <p:spPr>
+              <a:xfrm>
+                <a:off x="3996537" y="1735054"/>
+                <a:ext cx="1367111" cy="1156703"/>
+              </a:xfrm>
+              <a:prstGeom prst="roundRect">
+                <a:avLst/>
+              </a:prstGeom>
+            </p:spPr>
+            <p:style>
+              <a:lnRef idx="1">
+                <a:schemeClr val="accent1"/>
+              </a:lnRef>
+              <a:fillRef idx="3">
+                <a:schemeClr val="accent1"/>
+              </a:fillRef>
+              <a:effectRef idx="2">
+                <a:schemeClr val="accent1"/>
+              </a:effectRef>
+              <a:fontRef idx="minor">
+                <a:schemeClr val="lt1"/>
+              </a:fontRef>
+            </p:style>
+            <p:txBody>
+              <a:bodyPr rtlCol="0" anchor="ctr"/>
+              <a:lstStyle/>
+              <a:p>
+                <a:pPr algn="ctr"/>
+                <a:r>
+                  <a:rPr lang="en-US" dirty="0" err="1" smtClean="0"/>
+                  <a:t>Node.js</a:t>
+                </a:r>
+                <a:endParaRPr lang="en-US" dirty="0" smtClean="0"/>
+              </a:p>
+              <a:p>
+                <a:pPr algn="ctr"/>
+                <a:r>
+                  <a:rPr lang="en-US" dirty="0" smtClean="0"/>
+                  <a:t>web server</a:t>
+                </a:r>
+                <a:endParaRPr lang="en-US" dirty="0"/>
+              </a:p>
+            </p:txBody>
+          </p:sp>
+          <p:sp>
+            <p:nvSpPr>
+              <p:cNvPr id="6" name="Rounded Rectangle 5"/>
+              <p:cNvSpPr/>
+              <p:nvPr/>
+            </p:nvSpPr>
+            <p:spPr>
+              <a:xfrm>
+                <a:off x="6888145" y="1735054"/>
+                <a:ext cx="1401130" cy="1156703"/>
+              </a:xfrm>
+              <a:prstGeom prst="roundRect">
+                <a:avLst/>
+              </a:prstGeom>
+            </p:spPr>
+            <p:style>
+              <a:lnRef idx="1">
+                <a:schemeClr val="accent1"/>
+              </a:lnRef>
+              <a:fillRef idx="3">
+                <a:schemeClr val="accent1"/>
+              </a:fillRef>
+              <a:effectRef idx="2">
+                <a:schemeClr val="accent1"/>
+              </a:effectRef>
+              <a:fontRef idx="minor">
+                <a:schemeClr val="lt1"/>
+              </a:fontRef>
+            </p:style>
+            <p:txBody>
+              <a:bodyPr rtlCol="0" anchor="ctr"/>
+              <a:lstStyle/>
+              <a:p>
+                <a:pPr algn="ctr"/>
+                <a:r>
+                  <a:rPr lang="en-US" dirty="0" err="1" smtClean="0"/>
+                  <a:t>MongoDB</a:t>
+                </a:r>
+                <a:r>
+                  <a:rPr lang="en-US" dirty="0" smtClean="0"/>
+                  <a:t> database</a:t>
+                </a:r>
+              </a:p>
+            </p:txBody>
+          </p:sp>
+          <p:sp>
+            <p:nvSpPr>
+              <p:cNvPr id="7" name="TextBox 6"/>
+              <p:cNvSpPr txBox="1"/>
+              <p:nvPr/>
+            </p:nvSpPr>
+            <p:spPr>
+              <a:xfrm>
+                <a:off x="-487605" y="1753734"/>
+                <a:ext cx="895825" cy="1169551"/>
+              </a:xfrm>
+              <a:prstGeom prst="rect">
+                <a:avLst/>
+              </a:prstGeom>
+              <a:noFill/>
+            </p:spPr>
+            <p:txBody>
+              <a:bodyPr wrap="square" rtlCol="0">
+                <a:spAutoFit/>
+              </a:bodyPr>
+              <a:lstStyle/>
+              <a:p>
+                <a:pPr algn="ctr"/>
+                <a:r>
+                  <a:rPr lang="en-US" sz="1400" dirty="0" smtClean="0"/>
+                  <a:t>1. User inputs list</a:t>
+                </a:r>
+              </a:p>
+              <a:p>
+                <a:pPr algn="ctr"/>
+                <a:r>
+                  <a:rPr lang="en-US" sz="1400" dirty="0" smtClean="0"/>
+                  <a:t>of perturbagens</a:t>
+                </a:r>
+                <a:endParaRPr lang="en-US" sz="1400" dirty="0"/>
+              </a:p>
+            </p:txBody>
+          </p:sp>
+          <p:cxnSp>
+            <p:nvCxnSpPr>
+              <p:cNvPr id="9" name="Straight Arrow Connector 8"/>
+              <p:cNvCxnSpPr/>
+              <p:nvPr/>
+            </p:nvCxnSpPr>
+            <p:spPr>
+              <a:xfrm flipV="1">
+                <a:off x="408221" y="2338509"/>
+                <a:ext cx="612346" cy="1"/>
+              </a:xfrm>
+              <a:prstGeom prst="straightConnector1">
+                <a:avLst/>
+              </a:prstGeom>
+              <a:ln>
+                <a:tailEnd type="arrow"/>
+              </a:ln>
+            </p:spPr>
+            <p:style>
+              <a:lnRef idx="2">
+                <a:schemeClr val="accent1"/>
+              </a:lnRef>
+              <a:fillRef idx="0">
+                <a:schemeClr val="accent1"/>
+              </a:fillRef>
+              <a:effectRef idx="1">
+                <a:schemeClr val="accent1"/>
+              </a:effectRef>
+              <a:fontRef idx="minor">
+                <a:schemeClr val="tx1"/>
+              </a:fontRef>
+            </p:style>
+          </p:cxnSp>
+          <p:cxnSp>
+            <p:nvCxnSpPr>
+              <p:cNvPr id="12" name="Straight Arrow Connector 11"/>
+              <p:cNvCxnSpPr/>
+              <p:nvPr/>
+            </p:nvCxnSpPr>
+            <p:spPr>
+              <a:xfrm>
+                <a:off x="3004318" y="2007250"/>
+                <a:ext cx="476265" cy="0"/>
+              </a:xfrm>
+              <a:prstGeom prst="straightConnector1">
+                <a:avLst/>
+              </a:prstGeom>
+              <a:ln>
+                <a:tailEnd type="arrow"/>
+              </a:ln>
+            </p:spPr>
+            <p:style>
+              <a:lnRef idx="2">
+                <a:schemeClr val="accent1"/>
+              </a:lnRef>
+              <a:fillRef idx="0">
+                <a:schemeClr val="accent1"/>
+              </a:fillRef>
+              <a:effectRef idx="1">
+                <a:schemeClr val="accent1"/>
+              </a:effectRef>
+              <a:fontRef idx="minor">
+                <a:schemeClr val="tx1"/>
+              </a:fontRef>
+            </p:style>
+          </p:cxnSp>
+          <p:sp>
+            <p:nvSpPr>
+              <p:cNvPr id="13" name="TextBox 12"/>
+              <p:cNvSpPr txBox="1"/>
+              <p:nvPr/>
+            </p:nvSpPr>
+            <p:spPr>
+              <a:xfrm>
+                <a:off x="2211233" y="1211834"/>
+                <a:ext cx="1915712" cy="523220"/>
+              </a:xfrm>
+              <a:prstGeom prst="rect">
+                <a:avLst/>
+              </a:prstGeom>
+              <a:noFill/>
+            </p:spPr>
+            <p:txBody>
+              <a:bodyPr wrap="square" rtlCol="0">
+                <a:spAutoFit/>
+              </a:bodyPr>
+              <a:lstStyle/>
+              <a:p>
+                <a:pPr algn="ctr"/>
+                <a:r>
+                  <a:rPr lang="en-US" sz="1400" dirty="0" smtClean="0"/>
+                  <a:t>2. query for connectivity scores</a:t>
+                </a:r>
+                <a:endParaRPr lang="en-US" sz="1400" dirty="0"/>
+              </a:p>
+            </p:txBody>
+          </p:sp>
+          <p:cxnSp>
+            <p:nvCxnSpPr>
+              <p:cNvPr id="14" name="Straight Arrow Connector 13"/>
+              <p:cNvCxnSpPr/>
+              <p:nvPr/>
+            </p:nvCxnSpPr>
+            <p:spPr>
+              <a:xfrm flipH="1">
+                <a:off x="3004317" y="2619529"/>
+                <a:ext cx="476266" cy="0"/>
+              </a:xfrm>
+              <a:prstGeom prst="straightConnector1">
+                <a:avLst/>
+              </a:prstGeom>
+              <a:ln>
+                <a:tailEnd type="arrow"/>
+              </a:ln>
+            </p:spPr>
+            <p:style>
+              <a:lnRef idx="2">
+                <a:schemeClr val="accent1"/>
+              </a:lnRef>
+              <a:fillRef idx="0">
+                <a:schemeClr val="accent1"/>
+              </a:fillRef>
+              <a:effectRef idx="1">
+                <a:schemeClr val="accent1"/>
+              </a:effectRef>
+              <a:fontRef idx="minor">
+                <a:schemeClr val="tx1"/>
+              </a:fontRef>
+            </p:style>
+          </p:cxnSp>
+          <p:sp>
+            <p:nvSpPr>
+              <p:cNvPr id="18" name="TextBox 17"/>
+              <p:cNvSpPr txBox="1"/>
+              <p:nvPr/>
+            </p:nvSpPr>
+            <p:spPr>
+              <a:xfrm>
+                <a:off x="2211233" y="2870667"/>
+                <a:ext cx="1785304" cy="954107"/>
+              </a:xfrm>
+              <a:prstGeom prst="rect">
+                <a:avLst/>
+              </a:prstGeom>
+              <a:noFill/>
+            </p:spPr>
+            <p:txBody>
+              <a:bodyPr wrap="square" rtlCol="0">
+                <a:spAutoFit/>
+              </a:bodyPr>
+              <a:lstStyle/>
+              <a:p>
+                <a:pPr algn="ctr"/>
+                <a:r>
+                  <a:rPr lang="en-US" sz="1400" dirty="0"/>
+                  <a:t>7</a:t>
+                </a:r>
+                <a:r>
+                  <a:rPr lang="en-US" sz="1400" dirty="0" smtClean="0"/>
+                  <a:t>. original query response and clique metrics </a:t>
+                </a:r>
+                <a:r>
+                  <a:rPr lang="en-US" sz="1400" dirty="0" smtClean="0"/>
+                  <a:t>passed to application</a:t>
+                </a:r>
+                <a:endParaRPr lang="en-US" sz="1400" dirty="0"/>
+              </a:p>
+            </p:txBody>
+          </p:sp>
+          <p:cxnSp>
+            <p:nvCxnSpPr>
+              <p:cNvPr id="19" name="Straight Arrow Connector 18"/>
+              <p:cNvCxnSpPr/>
+              <p:nvPr/>
+            </p:nvCxnSpPr>
+            <p:spPr>
+              <a:xfrm>
+                <a:off x="5906585" y="1973198"/>
+                <a:ext cx="476265" cy="0"/>
+              </a:xfrm>
+              <a:prstGeom prst="straightConnector1">
+                <a:avLst/>
+              </a:prstGeom>
+              <a:ln>
+                <a:tailEnd type="arrow"/>
+              </a:ln>
+            </p:spPr>
+            <p:style>
+              <a:lnRef idx="2">
+                <a:schemeClr val="accent1"/>
+              </a:lnRef>
+              <a:fillRef idx="0">
+                <a:schemeClr val="accent1"/>
+              </a:fillRef>
+              <a:effectRef idx="1">
+                <a:schemeClr val="accent1"/>
+              </a:effectRef>
+              <a:fontRef idx="minor">
+                <a:schemeClr val="tx1"/>
+              </a:fontRef>
+            </p:style>
+          </p:cxnSp>
+          <p:sp>
+            <p:nvSpPr>
+              <p:cNvPr id="20" name="TextBox 19"/>
+              <p:cNvSpPr txBox="1"/>
+              <p:nvPr/>
+            </p:nvSpPr>
+            <p:spPr>
+              <a:xfrm>
+                <a:off x="5316925" y="1211834"/>
+                <a:ext cx="1699581" cy="523220"/>
+              </a:xfrm>
+              <a:prstGeom prst="rect">
+                <a:avLst/>
+              </a:prstGeom>
+              <a:noFill/>
+            </p:spPr>
+            <p:txBody>
+              <a:bodyPr wrap="square" rtlCol="0">
+                <a:spAutoFit/>
+              </a:bodyPr>
+              <a:lstStyle/>
+              <a:p>
+                <a:pPr algn="ctr"/>
+                <a:r>
+                  <a:rPr lang="en-US" sz="1400" dirty="0" smtClean="0"/>
+                  <a:t>3. query passed to </a:t>
+                </a:r>
+                <a:r>
+                  <a:rPr lang="en-US" sz="1400" dirty="0" err="1" smtClean="0"/>
+                  <a:t>MongoDB</a:t>
+                </a:r>
+                <a:endParaRPr lang="en-US" sz="1400" dirty="0"/>
+              </a:p>
+            </p:txBody>
+          </p:sp>
+          <p:cxnSp>
+            <p:nvCxnSpPr>
+              <p:cNvPr id="21" name="Straight Arrow Connector 20"/>
+              <p:cNvCxnSpPr/>
+              <p:nvPr/>
+            </p:nvCxnSpPr>
+            <p:spPr>
+              <a:xfrm flipH="1">
+                <a:off x="5906585" y="2619529"/>
+                <a:ext cx="476266" cy="0"/>
+              </a:xfrm>
+              <a:prstGeom prst="straightConnector1">
+                <a:avLst/>
+              </a:prstGeom>
+              <a:ln>
+                <a:tailEnd type="arrow"/>
+              </a:ln>
+            </p:spPr>
+            <p:style>
+              <a:lnRef idx="2">
+                <a:schemeClr val="accent1"/>
+              </a:lnRef>
+              <a:fillRef idx="0">
+                <a:schemeClr val="accent1"/>
+              </a:fillRef>
+              <a:effectRef idx="1">
+                <a:schemeClr val="accent1"/>
+              </a:effectRef>
+              <a:fontRef idx="minor">
+                <a:schemeClr val="tx1"/>
+              </a:fontRef>
+            </p:style>
+          </p:cxnSp>
+          <p:sp>
+            <p:nvSpPr>
+              <p:cNvPr id="22" name="TextBox 21"/>
+              <p:cNvSpPr txBox="1"/>
+              <p:nvPr/>
+            </p:nvSpPr>
+            <p:spPr>
+              <a:xfrm>
+                <a:off x="5214170" y="2891757"/>
+                <a:ext cx="1849060" cy="523220"/>
+              </a:xfrm>
+              <a:prstGeom prst="rect">
+                <a:avLst/>
+              </a:prstGeom>
+              <a:noFill/>
+            </p:spPr>
+            <p:txBody>
+              <a:bodyPr wrap="square" rtlCol="0">
+                <a:spAutoFit/>
+              </a:bodyPr>
+              <a:lstStyle/>
+              <a:p>
+                <a:pPr algn="ctr"/>
+                <a:r>
+                  <a:rPr lang="en-US" sz="1400" dirty="0" smtClean="0"/>
+                  <a:t>4. query response as JSON objects</a:t>
+                </a:r>
+                <a:endParaRPr lang="en-US" sz="1400" dirty="0"/>
+              </a:p>
+            </p:txBody>
+          </p:sp>
+        </p:grpSp>
+        <p:sp>
+          <p:nvSpPr>
+            <p:cNvPr id="16" name="Rounded Rectangle 15"/>
+            <p:cNvSpPr/>
+            <p:nvPr/>
+          </p:nvSpPr>
+          <p:spPr>
+            <a:xfrm>
+              <a:off x="3996537" y="4915842"/>
+              <a:ext cx="1367111" cy="1196539"/>
+            </a:xfrm>
+            <a:prstGeom prst="roundRect">
+              <a:avLst/>
+            </a:prstGeom>
+          </p:spPr>
+          <p:style>
+            <a:lnRef idx="1">
+              <a:schemeClr val="accent1"/>
+            </a:lnRef>
+            <a:fillRef idx="3">
+              <a:schemeClr val="accent1"/>
+            </a:fillRef>
+            <a:effectRef idx="2">
+              <a:schemeClr val="accent1"/>
+            </a:effectRef>
+            <a:fontRef idx="minor">
+              <a:schemeClr val="lt1"/>
+            </a:fontRef>
+          </p:style>
+          <p:txBody>
+            <a:bodyPr rtlCol="0" anchor="ctr"/>
+            <a:lstStyle/>
+            <a:p>
+              <a:pPr algn="ctr"/>
+              <a:r>
+                <a:rPr lang="en-US" dirty="0" smtClean="0"/>
+                <a:t>R / </a:t>
+              </a:r>
+              <a:r>
+                <a:rPr lang="en-US" dirty="0" err="1" smtClean="0"/>
+                <a:t>igraph</a:t>
+              </a:r>
+              <a:endParaRPr lang="en-US" dirty="0"/>
+            </a:p>
+          </p:txBody>
+        </p:sp>
+        <p:grpSp>
+          <p:nvGrpSpPr>
+            <p:cNvPr id="2" name="Group 1"/>
+            <p:cNvGrpSpPr/>
+            <p:nvPr/>
+          </p:nvGrpSpPr>
+          <p:grpSpPr>
+            <a:xfrm rot="5400000">
+              <a:off x="3836822" y="3571769"/>
+              <a:ext cx="1734184" cy="646331"/>
+              <a:chOff x="4652871" y="3463776"/>
+              <a:chExt cx="476266" cy="646331"/>
+            </a:xfrm>
+          </p:grpSpPr>
+          <p:cxnSp>
+            <p:nvCxnSpPr>
+              <p:cNvPr id="17" name="Straight Arrow Connector 16"/>
+              <p:cNvCxnSpPr/>
+              <p:nvPr/>
+            </p:nvCxnSpPr>
+            <p:spPr>
+              <a:xfrm>
+                <a:off x="4652871" y="3463776"/>
+                <a:ext cx="476265" cy="0"/>
+              </a:xfrm>
+              <a:prstGeom prst="straightConnector1">
+                <a:avLst/>
+              </a:prstGeom>
+              <a:ln>
+                <a:tailEnd type="arrow"/>
+              </a:ln>
+            </p:spPr>
+            <p:style>
+              <a:lnRef idx="2">
+                <a:schemeClr val="accent1"/>
+              </a:lnRef>
+              <a:fillRef idx="0">
+                <a:schemeClr val="accent1"/>
+              </a:fillRef>
+              <a:effectRef idx="1">
+                <a:schemeClr val="accent1"/>
+              </a:effectRef>
+              <a:fontRef idx="minor">
+                <a:schemeClr val="tx1"/>
+              </a:fontRef>
+            </p:style>
+          </p:cxnSp>
+          <p:cxnSp>
+            <p:nvCxnSpPr>
+              <p:cNvPr id="23" name="Straight Arrow Connector 22"/>
+              <p:cNvCxnSpPr/>
+              <p:nvPr/>
+            </p:nvCxnSpPr>
+            <p:spPr>
+              <a:xfrm flipH="1">
+                <a:off x="4652871" y="4110107"/>
+                <a:ext cx="476266" cy="0"/>
+              </a:xfrm>
+              <a:prstGeom prst="straightConnector1">
+                <a:avLst/>
+              </a:prstGeom>
+              <a:ln>
+                <a:tailEnd type="arrow"/>
+              </a:ln>
+            </p:spPr>
+            <p:style>
+              <a:lnRef idx="2">
+                <a:schemeClr val="accent1"/>
+              </a:lnRef>
+              <a:fillRef idx="0">
+                <a:schemeClr val="accent1"/>
+              </a:fillRef>
+              <a:effectRef idx="1">
+                <a:schemeClr val="accent1"/>
+              </a:effectRef>
+              <a:fontRef idx="minor">
+                <a:schemeClr val="tx1"/>
+              </a:fontRef>
+            </p:style>
+          </p:cxnSp>
+        </p:grpSp>
+        <p:sp>
+          <p:nvSpPr>
+            <p:cNvPr id="24" name="TextBox 23"/>
+            <p:cNvSpPr txBox="1"/>
+            <p:nvPr/>
+          </p:nvSpPr>
+          <p:spPr>
+            <a:xfrm>
+              <a:off x="5214170" y="4238805"/>
+              <a:ext cx="1372096" cy="523220"/>
+            </a:xfrm>
+            <a:prstGeom prst="rect">
+              <a:avLst/>
+            </a:prstGeom>
+            <a:noFill/>
+          </p:spPr>
+          <p:txBody>
+            <a:bodyPr wrap="square" rtlCol="0">
+              <a:spAutoFit/>
+            </a:bodyPr>
+            <a:lstStyle/>
+            <a:p>
+              <a:pPr algn="ctr"/>
+              <a:r>
+                <a:rPr lang="en-US" sz="1400" dirty="0" smtClean="0"/>
+                <a:t>5</a:t>
+              </a:r>
+              <a:r>
+                <a:rPr lang="en-US" sz="1400" dirty="0" smtClean="0"/>
+                <a:t>. </a:t>
+              </a:r>
+              <a:r>
+                <a:rPr lang="en-US" sz="1400" dirty="0" smtClean="0"/>
+                <a:t>compute clique metrics</a:t>
+              </a:r>
+              <a:endParaRPr lang="en-US" sz="1400" dirty="0"/>
+            </a:p>
+          </p:txBody>
+        </p:sp>
+        <p:sp>
+          <p:nvSpPr>
+            <p:cNvPr id="26" name="TextBox 25"/>
+            <p:cNvSpPr txBox="1"/>
+            <p:nvPr/>
+          </p:nvSpPr>
+          <p:spPr>
+            <a:xfrm>
+              <a:off x="1816833" y="4238805"/>
+              <a:ext cx="2374969" cy="738664"/>
+            </a:xfrm>
+            <a:prstGeom prst="rect">
+              <a:avLst/>
+            </a:prstGeom>
+            <a:noFill/>
+          </p:spPr>
+          <p:txBody>
+            <a:bodyPr wrap="square" rtlCol="0">
+              <a:spAutoFit/>
+            </a:bodyPr>
+            <a:lstStyle/>
+            <a:p>
+              <a:pPr algn="ctr"/>
+              <a:r>
+                <a:rPr lang="en-US" sz="1400" dirty="0"/>
+                <a:t>6</a:t>
+              </a:r>
+              <a:r>
+                <a:rPr lang="en-US" sz="1400" dirty="0" smtClean="0"/>
+                <a:t>. insert analysis record into database and send </a:t>
+              </a:r>
+              <a:r>
+                <a:rPr lang="en-US" sz="1400" dirty="0" err="1" smtClean="0"/>
+                <a:t>analysis_id</a:t>
+              </a:r>
+              <a:r>
+                <a:rPr lang="en-US" sz="1400" dirty="0" smtClean="0"/>
+                <a:t> to Node</a:t>
+              </a:r>
+              <a:endParaRPr lang="en-US" sz="1400" dirty="0"/>
+            </a:p>
+          </p:txBody>
+        </p:sp>
+      </p:grpSp>
+    </p:spTree>
+    <p:extLst>
+      <p:ext uri="{BB962C8B-B14F-4D97-AF65-F5344CB8AC3E}">
+        <p14:creationId xmlns:p14="http://schemas.microsoft.com/office/powerpoint/2010/main" val="635579719"/>
+      </p:ext>
+    </p:extLst>
+  </p:cSld>
+  <p:clrMapOvr>
+    <a:masterClrMapping/>
+  </p:clrMapOvr>
+</p:sld>
+</file>
+
+<file path=ppt/slides/slide3.xml><?xml version="1.0" encoding="utf-8"?>
+<p:sld xmlns:a="http://schemas.openxmlformats.org/drawingml/2006/main" xmlns:r="http://schemas.openxmlformats.org/officeDocument/2006/relationships" xmlns:p="http://schemas.openxmlformats.org/presentationml/2006/main">
+  <p:cSld>
+    <p:spTree>
+      <p:nvGrpSpPr>
+        <p:cNvPr id="1" name=""/>
+        <p:cNvGrpSpPr/>
+        <p:nvPr/>
+      </p:nvGrpSpPr>
+      <p:grpSpPr>
+        <a:xfrm>
+          <a:off x="0" y="0"/>
+          <a:ext cx="0" cy="0"/>
+          <a:chOff x="0" y="0"/>
+          <a:chExt cx="0" cy="0"/>
+        </a:xfrm>
+      </p:grpSpPr>
       <p:sp>
         <p:nvSpPr>
           <p:cNvPr id="2" name="Rounded Rectangle 1"/>
@@ -3915,7 +4661,6 @@
               <a:rPr lang="en-US" dirty="0"/>
               <a:t> </a:t>
             </a:r>
-            <a:endParaRPr lang="en-US" dirty="0"/>
           </a:p>
         </p:txBody>
       </p:sp>

</xml_diff>